<commit_message>
added and mofied stuff on ppt3
</commit_message>
<xml_diff>
--- a/Itérations/Présentation IT2.pptx
+++ b/Itérations/Présentation IT2.pptx
@@ -5,14 +5,17 @@
     <p:sldMasterId id="2147483665" r:id="rId1"/>
   </p:sldMasterIdLst>
   <p:notesMasterIdLst>
-    <p:notesMasterId r:id="rId7"/>
+    <p:notesMasterId r:id="rId10"/>
   </p:notesMasterIdLst>
   <p:sldIdLst>
     <p:sldId id="256" r:id="rId2"/>
     <p:sldId id="257" r:id="rId3"/>
-    <p:sldId id="263" r:id="rId4"/>
-    <p:sldId id="265" r:id="rId5"/>
-    <p:sldId id="264" r:id="rId6"/>
+    <p:sldId id="258" r:id="rId4"/>
+    <p:sldId id="259" r:id="rId5"/>
+    <p:sldId id="260" r:id="rId6"/>
+    <p:sldId id="261" r:id="rId7"/>
+    <p:sldId id="263" r:id="rId8"/>
+    <p:sldId id="264" r:id="rId9"/>
   </p:sldIdLst>
   <p:sldSz cx="10080625" cy="7559675"/>
   <p:notesSz cx="7772400" cy="10058400"/>
@@ -207,7 +210,7 @@
           <a:p>
             <a:fld id="{D3CBC699-985C-4670-9E09-1EFD0EAA6BEB}" type="datetimeFigureOut">
               <a:rPr lang="fr-FR" smtClean="0"/>
-              <a:t>20/01/2017</a:t>
+              <a:t>20/12/2016</a:t>
             </a:fld>
             <a:endParaRPr lang="fr-FR"/>
           </a:p>
@@ -518,6 +521,24 @@
           <a:bodyPr/>
           <a:lstStyle/>
           <a:p>
+            <a:r>
+              <a:rPr lang="fr-FR" dirty="0"/>
+              <a:t>Thibaud</a:t>
+            </a:r>
+            <a:r>
+              <a:rPr lang="fr-FR" baseline="0" dirty="0"/>
+              <a:t> :</a:t>
+            </a:r>
+          </a:p>
+          <a:p>
+            <a:r>
+              <a:rPr lang="fr-FR" dirty="0"/>
+              <a:t>Présenter </a:t>
+            </a:r>
+            <a:r>
+              <a:rPr lang="fr-FR" baseline="0" dirty="0"/>
+              <a:t>l’itération</a:t>
+            </a:r>
             <a:endParaRPr lang="fr-FR" dirty="0"/>
           </a:p>
         </p:txBody>
@@ -602,6 +623,24 @@
           <a:bodyPr/>
           <a:lstStyle/>
           <a:p>
+            <a:r>
+              <a:rPr lang="fr-FR" dirty="0"/>
+              <a:t>Thibaud</a:t>
+            </a:r>
+            <a:r>
+              <a:rPr lang="fr-FR" baseline="0" dirty="0"/>
+              <a:t> :</a:t>
+            </a:r>
+          </a:p>
+          <a:p>
+            <a:r>
+              <a:rPr lang="fr-FR" dirty="0"/>
+              <a:t>Présenter</a:t>
+            </a:r>
+            <a:r>
+              <a:rPr lang="fr-FR" baseline="0" dirty="0"/>
+              <a:t> les objectifs</a:t>
+            </a:r>
             <a:endParaRPr lang="fr-FR" dirty="0"/>
           </a:p>
         </p:txBody>
@@ -686,33 +725,12 @@
           <a:bodyPr/>
           <a:lstStyle/>
           <a:p>
-            <a:pPr marL="171450" indent="-171450">
-              <a:buFontTx/>
-              <a:buChar char="-"/>
-            </a:pPr>
             <a:r>
               <a:rPr lang="fr-FR" dirty="0"/>
-              <a:t>Couleurs dans les </a:t>
-            </a:r>
-            <a:r>
-              <a:rPr lang="fr-FR" dirty="0" err="1"/>
-              <a:t>favs</a:t>
-            </a:r>
-            <a:endParaRPr lang="fr-FR" dirty="0"/>
-          </a:p>
-          <a:p>
-            <a:pPr marL="171450" indent="-171450">
-              <a:buFontTx/>
-              <a:buChar char="-"/>
-            </a:pPr>
-            <a:r>
-              <a:rPr lang="fr-FR" dirty="0"/>
-              <a:t>- </a:t>
-            </a:r>
-            <a:r>
-              <a:rPr lang="fr-FR"/>
-              <a:t>packages récent</a:t>
-            </a:r>
+              <a:t>Thibaud :</a:t>
+            </a:r>
+          </a:p>
+          <a:p>
             <a:endParaRPr lang="fr-FR" dirty="0"/>
           </a:p>
         </p:txBody>
@@ -743,7 +761,7 @@
     </p:spTree>
     <p:extLst>
       <p:ext uri="{BB962C8B-B14F-4D97-AF65-F5344CB8AC3E}">
-        <p14:creationId xmlns:p14="http://schemas.microsoft.com/office/powerpoint/2010/main" val="1054931345"/>
+        <p14:creationId xmlns:p14="http://schemas.microsoft.com/office/powerpoint/2010/main" val="3226690947"/>
       </p:ext>
     </p:extLst>
   </p:cSld>
@@ -797,6 +815,30 @@
           <a:bodyPr/>
           <a:lstStyle/>
           <a:p>
+            <a:r>
+              <a:rPr lang="fr-FR" dirty="0"/>
+              <a:t>Antonin</a:t>
+            </a:r>
+            <a:r>
+              <a:rPr lang="fr-FR" baseline="0" dirty="0"/>
+              <a:t> :</a:t>
+            </a:r>
+          </a:p>
+          <a:p>
+            <a:r>
+              <a:rPr lang="fr-FR" baseline="0" dirty="0"/>
+              <a:t>Lire diapositive</a:t>
+            </a:r>
+          </a:p>
+          <a:p>
+            <a:r>
+              <a:rPr lang="fr-FR" dirty="0"/>
+              <a:t>Faire une démonstration</a:t>
+            </a:r>
+            <a:r>
+              <a:rPr lang="fr-FR" baseline="0" dirty="0"/>
+              <a:t> du site</a:t>
+            </a:r>
             <a:endParaRPr lang="fr-FR" dirty="0"/>
           </a:p>
         </p:txBody>
@@ -827,7 +869,7 @@
     </p:spTree>
     <p:extLst>
       <p:ext uri="{BB962C8B-B14F-4D97-AF65-F5344CB8AC3E}">
-        <p14:creationId xmlns:p14="http://schemas.microsoft.com/office/powerpoint/2010/main" val="1912653631"/>
+        <p14:creationId xmlns:p14="http://schemas.microsoft.com/office/powerpoint/2010/main" val="2283400468"/>
       </p:ext>
     </p:extLst>
   </p:cSld>
@@ -881,6 +923,12 @@
           <a:bodyPr/>
           <a:lstStyle/>
           <a:p>
+            <a:r>
+              <a:rPr lang="fr-FR" dirty="0"/>
+              <a:t>Guillaume :</a:t>
+            </a:r>
+          </a:p>
+          <a:p>
             <a:endParaRPr lang="fr-FR" dirty="0"/>
           </a:p>
         </p:txBody>
@@ -911,7 +959,111 @@
     </p:spTree>
     <p:extLst>
       <p:ext uri="{BB962C8B-B14F-4D97-AF65-F5344CB8AC3E}">
-        <p14:creationId xmlns:p14="http://schemas.microsoft.com/office/powerpoint/2010/main" val="769243214"/>
+        <p14:creationId xmlns:p14="http://schemas.microsoft.com/office/powerpoint/2010/main" val="3428107662"/>
+      </p:ext>
+    </p:extLst>
+  </p:cSld>
+  <p:clrMapOvr>
+    <a:masterClrMapping/>
+  </p:clrMapOvr>
+</p:notes>
+</file>
+
+<file path=ppt/notesSlides/notesSlide6.xml><?xml version="1.0" encoding="utf-8"?>
+<p:notes xmlns:a="http://schemas.openxmlformats.org/drawingml/2006/main" xmlns:r="http://schemas.openxmlformats.org/officeDocument/2006/relationships" xmlns:p="http://schemas.openxmlformats.org/presentationml/2006/main">
+  <p:cSld>
+    <p:spTree>
+      <p:nvGrpSpPr>
+        <p:cNvPr id="1" name=""/>
+        <p:cNvGrpSpPr/>
+        <p:nvPr/>
+      </p:nvGrpSpPr>
+      <p:grpSpPr>
+        <a:xfrm>
+          <a:off x="0" y="0"/>
+          <a:ext cx="0" cy="0"/>
+          <a:chOff x="0" y="0"/>
+          <a:chExt cx="0" cy="0"/>
+        </a:xfrm>
+      </p:grpSpPr>
+      <p:sp>
+        <p:nvSpPr>
+          <p:cNvPr id="2" name="Espace réservé de l'image des diapositives 1"/>
+          <p:cNvSpPr>
+            <a:spLocks noGrp="1" noRot="1" noChangeAspect="1"/>
+          </p:cNvSpPr>
+          <p:nvPr>
+            <p:ph type="sldImg"/>
+          </p:nvPr>
+        </p:nvSpPr>
+        <p:spPr/>
+      </p:sp>
+      <p:sp>
+        <p:nvSpPr>
+          <p:cNvPr id="3" name="Espace réservé des notes 2"/>
+          <p:cNvSpPr>
+            <a:spLocks noGrp="1"/>
+          </p:cNvSpPr>
+          <p:nvPr>
+            <p:ph type="body" idx="1"/>
+          </p:nvPr>
+        </p:nvSpPr>
+        <p:spPr/>
+        <p:txBody>
+          <a:bodyPr/>
+          <a:lstStyle/>
+          <a:p>
+            <a:r>
+              <a:rPr lang="fr-FR" dirty="0"/>
+              <a:t>Léo :</a:t>
+            </a:r>
+          </a:p>
+          <a:p>
+            <a:r>
+              <a:rPr lang="fr-FR" dirty="0"/>
+              <a:t>Lire diapositive</a:t>
+            </a:r>
+          </a:p>
+          <a:p>
+            <a:r>
+              <a:rPr lang="fr-FR" dirty="0"/>
+              <a:t>Faire</a:t>
+            </a:r>
+            <a:r>
+              <a:rPr lang="fr-FR" baseline="0" dirty="0"/>
+              <a:t> une démonstration du graphe</a:t>
+            </a:r>
+            <a:endParaRPr lang="fr-FR" dirty="0"/>
+          </a:p>
+        </p:txBody>
+      </p:sp>
+      <p:sp>
+        <p:nvSpPr>
+          <p:cNvPr id="4" name="Espace réservé du numéro de diapositive 3"/>
+          <p:cNvSpPr>
+            <a:spLocks noGrp="1"/>
+          </p:cNvSpPr>
+          <p:nvPr>
+            <p:ph type="sldNum" sz="quarter" idx="10"/>
+          </p:nvPr>
+        </p:nvSpPr>
+        <p:spPr/>
+        <p:txBody>
+          <a:bodyPr/>
+          <a:lstStyle/>
+          <a:p>
+            <a:fld id="{96A8DA0A-CDAF-4731-95C9-68D0B5CD43CA}" type="slidenum">
+              <a:rPr lang="fr-FR" smtClean="0"/>
+              <a:t>6</a:t>
+            </a:fld>
+            <a:endParaRPr lang="fr-FR"/>
+          </a:p>
+        </p:txBody>
+      </p:sp>
+    </p:spTree>
+    <p:extLst>
+      <p:ext uri="{BB962C8B-B14F-4D97-AF65-F5344CB8AC3E}">
+        <p14:creationId xmlns:p14="http://schemas.microsoft.com/office/powerpoint/2010/main" val="2723165059"/>
       </p:ext>
     </p:extLst>
   </p:cSld>
@@ -1050,7 +1202,7 @@
           <a:p>
             <a:fld id="{0800570A-E134-4FF7-B88B-964C98FC0B70}" type="datetime1">
               <a:rPr lang="fr-FR" smtClean="0"/>
-              <a:t>20/01/2017</a:t>
+              <a:t>20/12/2016</a:t>
             </a:fld>
             <a:endParaRPr lang="fr-FR"/>
           </a:p>
@@ -1072,9 +1224,10 @@
           <a:lstStyle/>
           <a:p>
             <a:r>
-              <a:rPr lang="fr-FR" dirty="0"/>
+              <a:rPr lang="fr-FR" dirty="0" smtClean="0"/>
               <a:t>Galt – PI S5 IL – Itération 2</a:t>
             </a:r>
+            <a:endParaRPr lang="fr-FR" dirty="0"/>
           </a:p>
         </p:txBody>
       </p:sp>
@@ -1413,7 +1566,7 @@
             <a:fld id="{9905D2EB-A0C9-4269-BED7-F488BFFF1574}" type="datetime1">
               <a:rPr lang="fr-FR" smtClean="0"/>
               <a:pPr/>
-              <a:t>20/01/2017</a:t>
+              <a:t>20/12/2016</a:t>
             </a:fld>
             <a:endParaRPr lang="fr-FR" dirty="0"/>
           </a:p>
@@ -1453,9 +1606,10 @@
           </a:lstStyle>
           <a:p>
             <a:r>
-              <a:rPr lang="fr-FR" dirty="0"/>
+              <a:rPr lang="fr-FR" dirty="0" smtClean="0"/>
               <a:t>Galt – PI S5 IL – Itération 2</a:t>
             </a:r>
+            <a:endParaRPr lang="fr-FR" dirty="0"/>
           </a:p>
         </p:txBody>
       </p:sp>
@@ -1818,7 +1972,7 @@
             <a:fld id="{9905D2EB-A0C9-4269-BED7-F488BFFF1574}" type="datetime1">
               <a:rPr lang="fr-FR" smtClean="0"/>
               <a:pPr/>
-              <a:t>20/01/2017</a:t>
+              <a:t>20/12/2016</a:t>
             </a:fld>
             <a:endParaRPr lang="fr-FR" dirty="0"/>
           </a:p>
@@ -1858,9 +2012,10 @@
           </a:lstStyle>
           <a:p>
             <a:r>
-              <a:rPr lang="fr-FR" dirty="0"/>
+              <a:rPr lang="fr-FR" dirty="0" smtClean="0"/>
               <a:t>Galt – PI S5 IL – Itération 2</a:t>
             </a:r>
+            <a:endParaRPr lang="fr-FR" dirty="0"/>
           </a:p>
         </p:txBody>
       </p:sp>
@@ -2222,7 +2377,7 @@
             <a:fld id="{9905D2EB-A0C9-4269-BED7-F488BFFF1574}" type="datetime1">
               <a:rPr lang="fr-FR" smtClean="0"/>
               <a:pPr/>
-              <a:t>20/01/2017</a:t>
+              <a:t>20/12/2016</a:t>
             </a:fld>
             <a:endParaRPr lang="fr-FR" dirty="0"/>
           </a:p>
@@ -2262,9 +2417,10 @@
           </a:lstStyle>
           <a:p>
             <a:r>
-              <a:rPr lang="fr-FR" dirty="0"/>
+              <a:rPr lang="fr-FR" dirty="0" smtClean="0"/>
               <a:t>Galt – PI S5 IL – Itération 2</a:t>
             </a:r>
+            <a:endParaRPr lang="fr-FR" dirty="0"/>
           </a:p>
         </p:txBody>
       </p:sp>
@@ -2531,7 +2687,7 @@
           <a:p>
             <a:fld id="{B0A1D0FA-A7FA-427E-B7E5-2C949F2ACC4D}" type="datetime1">
               <a:rPr lang="fr-FR" smtClean="0"/>
-              <a:t>20/01/2017</a:t>
+              <a:t>20/12/2016</a:t>
             </a:fld>
             <a:endParaRPr lang="fr-FR"/>
           </a:p>
@@ -2571,7 +2727,7 @@
           </a:lstStyle>
           <a:p>
             <a:r>
-              <a:rPr lang="fr-FR" dirty="0"/>
+              <a:rPr lang="fr-FR" dirty="0" smtClean="0"/>
               <a:t>Galt – PI S5 IL – Itération 2</a:t>
             </a:r>
           </a:p>
@@ -2983,6 +3139,7 @@
           </a:bodyPr>
           <a:lstStyle/>
           <a:p>
+            <a:pPr algn="r"/>
             <a:r>
               <a:rPr lang="fr-FR" sz="4800" b="1" dirty="0">
                 <a:solidFill>
@@ -2991,7 +3148,27 @@
                 <a:latin typeface="Trebuchet MS" panose="020B0603020202020204" pitchFamily="34" charset="0"/>
                 <a:ea typeface="MS PGothic" panose="020B0600070205080204" pitchFamily="34" charset="-128"/>
               </a:rPr>
-              <a:t>Recette	</a:t>
+              <a:t>Itération </a:t>
+            </a:r>
+            <a:r>
+              <a:rPr lang="fr-FR" sz="4800" b="1" dirty="0" smtClean="0">
+                <a:solidFill>
+                  <a:schemeClr val="bg1"/>
+                </a:solidFill>
+                <a:latin typeface="Trebuchet MS" panose="020B0603020202020204" pitchFamily="34" charset="0"/>
+                <a:ea typeface="MS PGothic" panose="020B0600070205080204" pitchFamily="34" charset="-128"/>
+              </a:rPr>
+              <a:t>2</a:t>
+            </a:r>
+            <a:r>
+              <a:rPr lang="fr-FR" sz="4800" b="1" dirty="0">
+                <a:solidFill>
+                  <a:schemeClr val="bg1"/>
+                </a:solidFill>
+                <a:latin typeface="Trebuchet MS" panose="020B0603020202020204" pitchFamily="34" charset="0"/>
+                <a:ea typeface="MS PGothic" panose="020B0600070205080204" pitchFamily="34" charset="-128"/>
+              </a:rPr>
+              <a:t>		</a:t>
             </a:r>
           </a:p>
         </p:txBody>
@@ -3336,8 +3513,13 @@
           <a:p>
             <a:r>
               <a:rPr lang="fr-FR" dirty="0"/>
-              <a:t>	Objectifs initiaux</a:t>
-            </a:r>
+              <a:t>	Objectifs d’itération </a:t>
+            </a:r>
+            <a:r>
+              <a:rPr lang="fr-FR" dirty="0" smtClean="0"/>
+              <a:t>2</a:t>
+            </a:r>
+            <a:endParaRPr lang="fr-FR" dirty="0"/>
           </a:p>
         </p:txBody>
       </p:sp>
@@ -3357,130 +3539,76 @@
           <a:lstStyle/>
           <a:p>
             <a:pPr marL="342900" indent="-342900">
-              <a:lnSpc>
-                <a:spcPct val="100000"/>
-              </a:lnSpc>
               <a:buClr>
                 <a:srgbClr val="000000"/>
               </a:buClr>
             </a:pPr>
             <a:r>
-              <a:rPr lang="fr-FR" dirty="0"/>
-              <a:t>Chaîne de </a:t>
-            </a:r>
-            <a:r>
-              <a:rPr lang="fr-FR" dirty="0" err="1"/>
-              <a:t>build</a:t>
-            </a:r>
-            <a:r>
-              <a:rPr lang="fr-FR" dirty="0"/>
-              <a:t> ayant pour utilité de compiler, lancer les tests unitaires et vérifier la couverture de code.</a:t>
-            </a:r>
-          </a:p>
-          <a:p>
-            <a:pPr marL="0" indent="0">
-              <a:lnSpc>
-                <a:spcPct val="100000"/>
-              </a:lnSpc>
-              <a:buClr>
-                <a:srgbClr val="000000"/>
-              </a:buClr>
-              <a:buNone/>
-            </a:pPr>
+              <a:rPr lang="fr-FR" dirty="0" smtClean="0"/>
+              <a:t>Terminer la connexion via GitHub</a:t>
+            </a:r>
             <a:endParaRPr lang="fr-FR" dirty="0"/>
           </a:p>
           <a:p>
             <a:pPr marL="342900" indent="-342900">
-              <a:lnSpc>
-                <a:spcPct val="100000"/>
-              </a:lnSpc>
               <a:buClr>
                 <a:srgbClr val="000000"/>
               </a:buClr>
             </a:pPr>
             <a:r>
-              <a:rPr lang="fr-FR" dirty="0"/>
-              <a:t>Création d’un serveur web .NET en modèle MVC gérant le côté client et la base de données.</a:t>
-            </a:r>
-          </a:p>
-          <a:p>
-            <a:pPr marL="0" indent="0">
-              <a:lnSpc>
-                <a:spcPct val="100000"/>
-              </a:lnSpc>
-              <a:buClr>
-                <a:srgbClr val="000000"/>
-              </a:buClr>
-              <a:buNone/>
-            </a:pPr>
-            <a:endParaRPr lang="fr-FR" dirty="0"/>
+              <a:rPr lang="fr-FR" dirty="0" smtClean="0"/>
+              <a:t>Crawler package </a:t>
+            </a:r>
+            <a:r>
+              <a:rPr lang="fr-FR" dirty="0" err="1" smtClean="0"/>
+              <a:t>Code.Cake</a:t>
+            </a:r>
+            <a:r>
+              <a:rPr lang="fr-FR" dirty="0" smtClean="0"/>
+              <a:t> sur </a:t>
+            </a:r>
+            <a:r>
+              <a:rPr lang="fr-FR" dirty="0" err="1" smtClean="0"/>
+              <a:t>Nuget</a:t>
+            </a:r>
+            <a:r>
+              <a:rPr lang="fr-FR" dirty="0" smtClean="0"/>
+              <a:t> et en récupérer les infos et dépendances</a:t>
+            </a:r>
           </a:p>
           <a:p>
             <a:pPr marL="342900" indent="-342900">
-              <a:lnSpc>
-                <a:spcPct val="100000"/>
-              </a:lnSpc>
               <a:buClr>
                 <a:srgbClr val="000000"/>
               </a:buClr>
             </a:pPr>
             <a:r>
-              <a:rPr lang="fr-FR" dirty="0"/>
-              <a:t>Création fonctionnalité permettant de chercher l’arbre des dépendances d’un package et de stocker le résultat dans la base de données.</a:t>
-            </a:r>
-          </a:p>
-          <a:p>
-            <a:pPr marL="0" indent="0">
-              <a:lnSpc>
-                <a:spcPct val="100000"/>
-              </a:lnSpc>
-              <a:buClr>
-                <a:srgbClr val="000000"/>
-              </a:buClr>
-              <a:buNone/>
-            </a:pPr>
-            <a:endParaRPr lang="fr-FR" dirty="0"/>
+              <a:rPr lang="fr-FR" dirty="0" smtClean="0"/>
+              <a:t>Avertir l’utilisateur lors de nouvelles versions disponibles ou de conflits</a:t>
+            </a:r>
           </a:p>
           <a:p>
             <a:pPr marL="342900" indent="-342900">
-              <a:lnSpc>
-                <a:spcPct val="100000"/>
-              </a:lnSpc>
               <a:buClr>
                 <a:srgbClr val="000000"/>
               </a:buClr>
             </a:pPr>
             <a:r>
-              <a:rPr lang="fr-FR" dirty="0"/>
-              <a:t>Création client web permettant à l’utilisateur de s’inscrire, se connecter, chercher un package, en récupérer les informations.</a:t>
-            </a:r>
+              <a:rPr lang="fr-FR" dirty="0" smtClean="0"/>
+              <a:t>Afficher les résultats d’une recherche de package sur </a:t>
+            </a:r>
+            <a:r>
+              <a:rPr lang="fr-FR" dirty="0" err="1" smtClean="0"/>
+              <a:t>NuGet</a:t>
+            </a:r>
+            <a:endParaRPr lang="fr-FR" dirty="0" smtClean="0"/>
           </a:p>
           <a:p>
             <a:pPr marL="0" indent="0">
-              <a:lnSpc>
-                <a:spcPct val="100000"/>
-              </a:lnSpc>
-              <a:buClr>
-                <a:srgbClr val="000000"/>
-              </a:buClr>
               <a:buNone/>
             </a:pPr>
             <a:endParaRPr lang="fr-FR" dirty="0"/>
           </a:p>
-          <a:p>
-            <a:pPr marL="342900" indent="-342900">
-              <a:lnSpc>
-                <a:spcPct val="100000"/>
-              </a:lnSpc>
-              <a:buClr>
-                <a:srgbClr val="000000"/>
-              </a:buClr>
-            </a:pPr>
-            <a:r>
-              <a:rPr lang="fr-FR" dirty="0"/>
-              <a:t>Afficher les graphes des dépendances à l’aide de la technologie web D3js.</a:t>
-            </a:r>
-          </a:p>
         </p:txBody>
       </p:sp>
       <p:sp>
@@ -3500,7 +3628,7 @@
           <a:p>
             <a:fld id="{9AEBC41D-566D-471B-BC6B-E875D8BD5980}" type="datetime1">
               <a:rPr lang="fr-FR" smtClean="0"/>
-              <a:t>20/01/2017</a:t>
+              <a:t>20/12/2016</a:t>
             </a:fld>
             <a:endParaRPr lang="fr-FR" dirty="0"/>
           </a:p>
@@ -3523,8 +3651,13 @@
           <a:p>
             <a:r>
               <a:rPr lang="fr-FR" dirty="0"/>
-              <a:t>Galt – PI S5 IL – Itération 2</a:t>
-            </a:r>
+              <a:t>Galt – PI S5 IL – Itération </a:t>
+            </a:r>
+            <a:r>
+              <a:rPr lang="fr-FR" dirty="0"/>
+              <a:t>2</a:t>
+            </a:r>
+            <a:endParaRPr lang="fr-FR" dirty="0"/>
           </a:p>
         </p:txBody>
       </p:sp>
@@ -3621,11 +3754,11 @@
           <a:p>
             <a:r>
               <a:rPr lang="fr-FR" dirty="0"/>
-              <a:t>	écart </a:t>
-            </a:r>
-            <a:r>
-              <a:rPr lang="fr-FR" dirty="0" err="1"/>
-              <a:t>objec</a:t>
+              <a:t>	</a:t>
+            </a:r>
+            <a:r>
+              <a:rPr lang="fr-FR" dirty="0" smtClean="0"/>
+              <a:t>La connexion GitHub</a:t>
             </a:r>
             <a:endParaRPr lang="fr-FR" dirty="0"/>
           </a:p>
@@ -3649,7 +3782,7 @@
             <a:fld id="{9905D2EB-A0C9-4269-BED7-F488BFFF1574}" type="datetime1">
               <a:rPr lang="fr-FR" smtClean="0"/>
               <a:pPr/>
-              <a:t>20/01/2017</a:t>
+              <a:t>20/12/2016</a:t>
             </a:fld>
             <a:endParaRPr lang="fr-FR" dirty="0"/>
           </a:p>
@@ -3672,8 +3805,13 @@
           <a:p>
             <a:r>
               <a:rPr lang="fr-FR" dirty="0"/>
-              <a:t>Galt – PI S5 IL – Itération 2</a:t>
-            </a:r>
+              <a:t>Galt – PI S5 IL – Itération </a:t>
+            </a:r>
+            <a:r>
+              <a:rPr lang="fr-FR" dirty="0"/>
+              <a:t>2</a:t>
+            </a:r>
+            <a:endParaRPr lang="fr-FR" dirty="0"/>
           </a:p>
         </p:txBody>
       </p:sp>
@@ -3696,6 +3834,984 @@
               <a:rPr lang="fr-FR" smtClean="0"/>
               <a:pPr/>
               <a:t>3</a:t>
+            </a:fld>
+            <a:endParaRPr lang="fr-FR" dirty="0"/>
+          </a:p>
+        </p:txBody>
+      </p:sp>
+      <p:sp>
+        <p:nvSpPr>
+          <p:cNvPr id="9" name="Espace réservé du contenu 8"/>
+          <p:cNvSpPr>
+            <a:spLocks noGrp="1"/>
+          </p:cNvSpPr>
+          <p:nvPr>
+            <p:ph sz="half" idx="2"/>
+          </p:nvPr>
+        </p:nvSpPr>
+        <p:spPr/>
+        <p:txBody>
+          <a:bodyPr>
+            <a:normAutofit/>
+          </a:bodyPr>
+          <a:lstStyle/>
+          <a:p>
+            <a:pPr defTabSz="361950">
+              <a:lnSpc>
+                <a:spcPct val="100000"/>
+              </a:lnSpc>
+            </a:pPr>
+            <a:r>
+              <a:rPr lang="fr-FR" dirty="0"/>
+              <a:t>	</a:t>
+            </a:r>
+            <a:r>
+              <a:rPr lang="fr-FR" dirty="0" smtClean="0"/>
+              <a:t>Guillaume</a:t>
+            </a:r>
+            <a:endParaRPr lang="fr-FR" dirty="0"/>
+          </a:p>
+        </p:txBody>
+      </p:sp>
+      <p:sp>
+        <p:nvSpPr>
+          <p:cNvPr id="3" name="Espace réservé du contenu 2"/>
+          <p:cNvSpPr>
+            <a:spLocks noGrp="1"/>
+          </p:cNvSpPr>
+          <p:nvPr>
+            <p:ph idx="1"/>
+          </p:nvPr>
+        </p:nvSpPr>
+        <p:spPr/>
+        <p:txBody>
+          <a:bodyPr/>
+          <a:lstStyle/>
+          <a:p>
+            <a:pPr marL="361800" indent="-361440"/>
+            <a:r>
+              <a:rPr lang="fr-FR" dirty="0">
+                <a:solidFill>
+                  <a:srgbClr val="2B5259"/>
+                </a:solidFill>
+                <a:latin typeface="Leelawadee"/>
+              </a:rPr>
+              <a:t>Connexion avec GitHub via </a:t>
+            </a:r>
+            <a:r>
+              <a:rPr lang="fr-FR" dirty="0" err="1">
+                <a:solidFill>
+                  <a:srgbClr val="2B5259"/>
+                </a:solidFill>
+                <a:latin typeface="Leelawadee"/>
+              </a:rPr>
+              <a:t>Oauth</a:t>
+            </a:r>
+            <a:endParaRPr lang="fr-FR" sz="2320" dirty="0">
+              <a:solidFill>
+                <a:srgbClr val="000000"/>
+              </a:solidFill>
+              <a:latin typeface="Calibri"/>
+            </a:endParaRPr>
+          </a:p>
+          <a:p>
+            <a:pPr marL="361800" indent="-361440"/>
+            <a:r>
+              <a:rPr lang="fr-FR" dirty="0">
+                <a:solidFill>
+                  <a:srgbClr val="2B5259"/>
+                </a:solidFill>
+                <a:latin typeface="Leelawadee"/>
+              </a:rPr>
+              <a:t>Utilisateurs mémorisés sur table Azure</a:t>
+            </a:r>
+            <a:endParaRPr lang="fr-FR" sz="2320" dirty="0">
+              <a:solidFill>
+                <a:srgbClr val="000000"/>
+              </a:solidFill>
+              <a:latin typeface="Calibri"/>
+            </a:endParaRPr>
+          </a:p>
+          <a:p>
+            <a:pPr marL="361800" indent="-361440"/>
+            <a:r>
+              <a:rPr lang="fr-FR" dirty="0">
+                <a:solidFill>
+                  <a:srgbClr val="2B5259"/>
+                </a:solidFill>
+                <a:latin typeface="Leelawadee"/>
+              </a:rPr>
+              <a:t>Utilisation de cookies pour mémoriser la connexion</a:t>
+            </a:r>
+            <a:endParaRPr lang="fr-FR" sz="2320" dirty="0">
+              <a:solidFill>
+                <a:srgbClr val="000000"/>
+              </a:solidFill>
+              <a:latin typeface="Calibri"/>
+            </a:endParaRPr>
+          </a:p>
+          <a:p>
+            <a:pPr marL="361800" indent="-361440"/>
+            <a:r>
+              <a:rPr lang="fr-FR" dirty="0">
+                <a:solidFill>
+                  <a:srgbClr val="2B5259"/>
+                </a:solidFill>
+                <a:latin typeface="Leelawadee"/>
+              </a:rPr>
+              <a:t>Possibilité d’utiliser l’API GitHub avec le </a:t>
+            </a:r>
+            <a:r>
+              <a:rPr lang="fr-FR" dirty="0" err="1">
+                <a:solidFill>
+                  <a:srgbClr val="2B5259"/>
+                </a:solidFill>
+                <a:latin typeface="Leelawadee"/>
+              </a:rPr>
+              <a:t>token</a:t>
+            </a:r>
+            <a:r>
+              <a:rPr lang="fr-FR" dirty="0">
+                <a:solidFill>
+                  <a:srgbClr val="2B5259"/>
+                </a:solidFill>
+                <a:latin typeface="Leelawadee"/>
+              </a:rPr>
+              <a:t> utilisateur</a:t>
+            </a:r>
+            <a:endParaRPr lang="fr-FR" sz="2320" dirty="0">
+              <a:solidFill>
+                <a:srgbClr val="000000"/>
+              </a:solidFill>
+              <a:latin typeface="Calibri"/>
+            </a:endParaRPr>
+          </a:p>
+          <a:p>
+            <a:endParaRPr lang="fr-FR" dirty="0"/>
+          </a:p>
+        </p:txBody>
+      </p:sp>
+    </p:spTree>
+    <p:extLst>
+      <p:ext uri="{BB962C8B-B14F-4D97-AF65-F5344CB8AC3E}">
+        <p14:creationId xmlns:p14="http://schemas.microsoft.com/office/powerpoint/2010/main" val="786579798"/>
+      </p:ext>
+    </p:extLst>
+  </p:cSld>
+  <p:clrMapOvr>
+    <a:masterClrMapping/>
+  </p:clrMapOvr>
+  <p:timing>
+    <p:tnLst>
+      <p:par>
+        <p:cTn id="1" dur="indefinite" restart="never" nodeType="tmRoot"/>
+      </p:par>
+    </p:tnLst>
+  </p:timing>
+</p:sld>
+</file>
+
+<file path=ppt/slides/slide4.xml><?xml version="1.0" encoding="utf-8"?>
+<p:sld xmlns:a="http://schemas.openxmlformats.org/drawingml/2006/main" xmlns:r="http://schemas.openxmlformats.org/officeDocument/2006/relationships" xmlns:p="http://schemas.openxmlformats.org/presentationml/2006/main">
+  <p:cSld>
+    <p:spTree>
+      <p:nvGrpSpPr>
+        <p:cNvPr id="1" name=""/>
+        <p:cNvGrpSpPr/>
+        <p:nvPr/>
+      </p:nvGrpSpPr>
+      <p:grpSpPr>
+        <a:xfrm>
+          <a:off x="0" y="0"/>
+          <a:ext cx="0" cy="0"/>
+          <a:chOff x="0" y="0"/>
+          <a:chExt cx="0" cy="0"/>
+        </a:xfrm>
+      </p:grpSpPr>
+      <p:sp>
+        <p:nvSpPr>
+          <p:cNvPr id="2" name="Titre 1"/>
+          <p:cNvSpPr>
+            <a:spLocks noGrp="1"/>
+          </p:cNvSpPr>
+          <p:nvPr>
+            <p:ph type="title"/>
+          </p:nvPr>
+        </p:nvSpPr>
+        <p:spPr/>
+        <p:txBody>
+          <a:bodyPr/>
+          <a:lstStyle/>
+          <a:p>
+            <a:r>
+              <a:rPr lang="fr-FR" dirty="0" smtClean="0"/>
+              <a:t>	Le </a:t>
+            </a:r>
+            <a:r>
+              <a:rPr lang="fr-FR" dirty="0" err="1" smtClean="0"/>
+              <a:t>crawling</a:t>
+            </a:r>
+            <a:endParaRPr lang="fr-FR" dirty="0"/>
+          </a:p>
+        </p:txBody>
+      </p:sp>
+      <p:sp>
+        <p:nvSpPr>
+          <p:cNvPr id="3" name="Espace réservé du contenu 2"/>
+          <p:cNvSpPr>
+            <a:spLocks noGrp="1"/>
+          </p:cNvSpPr>
+          <p:nvPr>
+            <p:ph idx="1"/>
+          </p:nvPr>
+        </p:nvSpPr>
+        <p:spPr/>
+        <p:txBody>
+          <a:bodyPr/>
+          <a:lstStyle/>
+          <a:p>
+            <a:pPr marL="361800" indent="-361440"/>
+            <a:r>
+              <a:rPr lang="fr-FR" dirty="0">
+                <a:solidFill>
+                  <a:srgbClr val="2B5259"/>
+                </a:solidFill>
+                <a:latin typeface="Leelawadee"/>
+              </a:rPr>
+              <a:t>Récupération d’un package par nom</a:t>
+            </a:r>
+            <a:endParaRPr lang="fr-FR" sz="2320" dirty="0">
+              <a:solidFill>
+                <a:srgbClr val="000000"/>
+              </a:solidFill>
+              <a:latin typeface="Calibri"/>
+            </a:endParaRPr>
+          </a:p>
+          <a:p>
+            <a:pPr marL="361800" indent="-361440"/>
+            <a:r>
+              <a:rPr lang="fr-FR" dirty="0">
+                <a:solidFill>
+                  <a:srgbClr val="2B5259"/>
+                </a:solidFill>
+                <a:latin typeface="Leelawadee"/>
+              </a:rPr>
+              <a:t>Récupération de ses informations (date publication, liste versions, liste </a:t>
+            </a:r>
+            <a:r>
+              <a:rPr lang="fr-FR" dirty="0" err="1">
+                <a:solidFill>
+                  <a:srgbClr val="2B5259"/>
+                </a:solidFill>
+                <a:latin typeface="Leelawadee"/>
+              </a:rPr>
+              <a:t>dép</a:t>
+            </a:r>
+            <a:r>
+              <a:rPr lang="fr-FR" dirty="0">
+                <a:solidFill>
+                  <a:srgbClr val="2B5259"/>
+                </a:solidFill>
+                <a:latin typeface="Leelawadee"/>
+              </a:rPr>
+              <a:t> pour chaque version, etc…)</a:t>
+            </a:r>
+            <a:endParaRPr lang="fr-FR" sz="2320" dirty="0">
+              <a:solidFill>
+                <a:srgbClr val="000000"/>
+              </a:solidFill>
+              <a:latin typeface="Calibri"/>
+            </a:endParaRPr>
+          </a:p>
+          <a:p>
+            <a:pPr marL="361800" indent="-361440"/>
+            <a:r>
+              <a:rPr lang="fr-FR" dirty="0">
+                <a:solidFill>
+                  <a:srgbClr val="2B5259"/>
+                </a:solidFill>
+                <a:latin typeface="Leelawadee"/>
+              </a:rPr>
+              <a:t>Sérialisation des packages et de leurs infos en JSON</a:t>
+            </a:r>
+            <a:endParaRPr lang="fr-FR" sz="2320" dirty="0">
+              <a:solidFill>
+                <a:srgbClr val="000000"/>
+              </a:solidFill>
+              <a:latin typeface="Calibri"/>
+            </a:endParaRPr>
+          </a:p>
+          <a:p>
+            <a:pPr marL="361800" indent="-361440"/>
+            <a:r>
+              <a:rPr lang="fr-FR" dirty="0">
+                <a:solidFill>
+                  <a:srgbClr val="2B5259"/>
+                </a:solidFill>
+                <a:latin typeface="Leelawadee"/>
+              </a:rPr>
+              <a:t>Stockage de chaque package sur une table Azure</a:t>
+            </a:r>
+            <a:endParaRPr lang="fr-FR" sz="2320" dirty="0">
+              <a:solidFill>
+                <a:srgbClr val="000000"/>
+              </a:solidFill>
+              <a:latin typeface="Calibri"/>
+            </a:endParaRPr>
+          </a:p>
+        </p:txBody>
+      </p:sp>
+      <p:sp>
+        <p:nvSpPr>
+          <p:cNvPr id="4" name="Espace réservé de la date 3"/>
+          <p:cNvSpPr>
+            <a:spLocks noGrp="1"/>
+          </p:cNvSpPr>
+          <p:nvPr>
+            <p:ph type="dt" sz="half" idx="10"/>
+          </p:nvPr>
+        </p:nvSpPr>
+        <p:spPr/>
+        <p:txBody>
+          <a:bodyPr/>
+          <a:lstStyle/>
+          <a:p>
+            <a:fld id="{9905D2EB-A0C9-4269-BED7-F488BFFF1574}" type="datetime1">
+              <a:rPr lang="fr-FR" smtClean="0"/>
+              <a:pPr/>
+              <a:t>20/12/2016</a:t>
+            </a:fld>
+            <a:endParaRPr lang="fr-FR" dirty="0"/>
+          </a:p>
+        </p:txBody>
+      </p:sp>
+      <p:sp>
+        <p:nvSpPr>
+          <p:cNvPr id="5" name="Espace réservé du pied de page 4"/>
+          <p:cNvSpPr>
+            <a:spLocks noGrp="1"/>
+          </p:cNvSpPr>
+          <p:nvPr>
+            <p:ph type="ftr" sz="quarter" idx="11"/>
+          </p:nvPr>
+        </p:nvSpPr>
+        <p:spPr/>
+        <p:txBody>
+          <a:bodyPr/>
+          <a:lstStyle/>
+          <a:p>
+            <a:r>
+              <a:rPr lang="fr-FR" dirty="0"/>
+              <a:t>Galt – PI S5 IL – Itération </a:t>
+            </a:r>
+            <a:r>
+              <a:rPr lang="fr-FR" dirty="0" smtClean="0"/>
+              <a:t>2</a:t>
+            </a:r>
+            <a:endParaRPr lang="fr-FR" dirty="0"/>
+          </a:p>
+        </p:txBody>
+      </p:sp>
+      <p:sp>
+        <p:nvSpPr>
+          <p:cNvPr id="6" name="Espace réservé du numéro de diapositive 5"/>
+          <p:cNvSpPr>
+            <a:spLocks noGrp="1"/>
+          </p:cNvSpPr>
+          <p:nvPr>
+            <p:ph type="sldNum" sz="quarter" idx="12"/>
+          </p:nvPr>
+        </p:nvSpPr>
+        <p:spPr/>
+        <p:txBody>
+          <a:bodyPr/>
+          <a:lstStyle/>
+          <a:p>
+            <a:fld id="{CE35DAD6-85E4-415C-A280-4771D4FE3E59}" type="slidenum">
+              <a:rPr lang="fr-FR" smtClean="0"/>
+              <a:pPr/>
+              <a:t>4</a:t>
+            </a:fld>
+            <a:endParaRPr lang="fr-FR" dirty="0"/>
+          </a:p>
+        </p:txBody>
+      </p:sp>
+      <p:sp>
+        <p:nvSpPr>
+          <p:cNvPr id="9" name="Espace réservé du contenu 8"/>
+          <p:cNvSpPr>
+            <a:spLocks noGrp="1"/>
+          </p:cNvSpPr>
+          <p:nvPr>
+            <p:ph sz="half" idx="2"/>
+          </p:nvPr>
+        </p:nvSpPr>
+        <p:spPr/>
+        <p:txBody>
+          <a:bodyPr>
+            <a:normAutofit/>
+          </a:bodyPr>
+          <a:lstStyle/>
+          <a:p>
+            <a:pPr defTabSz="361950"/>
+            <a:r>
+              <a:rPr lang="fr-FR" dirty="0"/>
+              <a:t>	</a:t>
+            </a:r>
+            <a:r>
+              <a:rPr lang="fr-FR" dirty="0" smtClean="0"/>
+              <a:t>Thibaud</a:t>
+            </a:r>
+            <a:endParaRPr lang="fr-FR" dirty="0"/>
+          </a:p>
+        </p:txBody>
+      </p:sp>
+    </p:spTree>
+    <p:extLst>
+      <p:ext uri="{BB962C8B-B14F-4D97-AF65-F5344CB8AC3E}">
+        <p14:creationId xmlns:p14="http://schemas.microsoft.com/office/powerpoint/2010/main" val="2098116287"/>
+      </p:ext>
+    </p:extLst>
+  </p:cSld>
+  <p:clrMapOvr>
+    <a:masterClrMapping/>
+  </p:clrMapOvr>
+  <p:timing>
+    <p:tnLst>
+      <p:par>
+        <p:cTn id="1" dur="indefinite" restart="never" nodeType="tmRoot"/>
+      </p:par>
+    </p:tnLst>
+  </p:timing>
+</p:sld>
+</file>
+
+<file path=ppt/slides/slide5.xml><?xml version="1.0" encoding="utf-8"?>
+<p:sld xmlns:a="http://schemas.openxmlformats.org/drawingml/2006/main" xmlns:r="http://schemas.openxmlformats.org/officeDocument/2006/relationships" xmlns:p="http://schemas.openxmlformats.org/presentationml/2006/main">
+  <p:cSld>
+    <p:spTree>
+      <p:nvGrpSpPr>
+        <p:cNvPr id="1" name=""/>
+        <p:cNvGrpSpPr/>
+        <p:nvPr/>
+      </p:nvGrpSpPr>
+      <p:grpSpPr>
+        <a:xfrm>
+          <a:off x="0" y="0"/>
+          <a:ext cx="0" cy="0"/>
+          <a:chOff x="0" y="0"/>
+          <a:chExt cx="0" cy="0"/>
+        </a:xfrm>
+      </p:grpSpPr>
+      <p:sp>
+        <p:nvSpPr>
+          <p:cNvPr id="2" name="Titre 1"/>
+          <p:cNvSpPr>
+            <a:spLocks noGrp="1"/>
+          </p:cNvSpPr>
+          <p:nvPr>
+            <p:ph type="title"/>
+          </p:nvPr>
+        </p:nvSpPr>
+        <p:spPr/>
+        <p:txBody>
+          <a:bodyPr>
+            <a:noAutofit/>
+          </a:bodyPr>
+          <a:lstStyle/>
+          <a:p>
+            <a:r>
+              <a:rPr lang="fr-FR" sz="1800" dirty="0"/>
+              <a:t>	</a:t>
+            </a:r>
+            <a:r>
+              <a:rPr lang="fr-FR" sz="1800" dirty="0" smtClean="0"/>
+              <a:t>Le bundle, la recherche de packages et les requêtes</a:t>
+            </a:r>
+            <a:endParaRPr lang="fr-FR" sz="1800" dirty="0"/>
+          </a:p>
+        </p:txBody>
+      </p:sp>
+      <p:sp>
+        <p:nvSpPr>
+          <p:cNvPr id="8" name="Espace réservé du contenu 7"/>
+          <p:cNvSpPr>
+            <a:spLocks noGrp="1"/>
+          </p:cNvSpPr>
+          <p:nvPr>
+            <p:ph idx="1"/>
+          </p:nvPr>
+        </p:nvSpPr>
+        <p:spPr>
+          <a:xfrm>
+            <a:off x="693043" y="2012414"/>
+            <a:ext cx="8781157" cy="4796544"/>
+          </a:xfrm>
+        </p:spPr>
+        <p:txBody>
+          <a:bodyPr/>
+          <a:lstStyle/>
+          <a:p>
+            <a:r>
+              <a:rPr lang="fr-FR" dirty="0" smtClean="0"/>
+              <a:t>Création du bundle du front end </a:t>
+            </a:r>
+            <a:r>
+              <a:rPr lang="fr-FR" dirty="0" err="1" smtClean="0"/>
+              <a:t>pourr</a:t>
+            </a:r>
+            <a:r>
+              <a:rPr lang="fr-FR" dirty="0" smtClean="0"/>
+              <a:t> le back end</a:t>
+            </a:r>
+          </a:p>
+          <a:p>
+            <a:r>
+              <a:rPr lang="fr-FR" dirty="0" smtClean="0"/>
+              <a:t>Tentative de passage en version 3 de l’API </a:t>
+            </a:r>
+            <a:r>
+              <a:rPr lang="fr-FR" dirty="0" err="1" smtClean="0"/>
+              <a:t>NuGet</a:t>
+            </a:r>
+            <a:endParaRPr lang="fr-FR" dirty="0" smtClean="0"/>
+          </a:p>
+          <a:p>
+            <a:r>
+              <a:rPr lang="fr-FR" dirty="0" smtClean="0"/>
+              <a:t>Début des requêtes HTTP pour transmettre les données du back end au front end</a:t>
+            </a:r>
+            <a:endParaRPr lang="fr-FR" dirty="0"/>
+          </a:p>
+        </p:txBody>
+      </p:sp>
+      <p:sp>
+        <p:nvSpPr>
+          <p:cNvPr id="4" name="Espace réservé de la date 3"/>
+          <p:cNvSpPr>
+            <a:spLocks noGrp="1"/>
+          </p:cNvSpPr>
+          <p:nvPr>
+            <p:ph type="dt" sz="half" idx="10"/>
+          </p:nvPr>
+        </p:nvSpPr>
+        <p:spPr/>
+        <p:txBody>
+          <a:bodyPr/>
+          <a:lstStyle/>
+          <a:p>
+            <a:fld id="{9905D2EB-A0C9-4269-BED7-F488BFFF1574}" type="datetime1">
+              <a:rPr lang="fr-FR" smtClean="0"/>
+              <a:pPr/>
+              <a:t>20/12/2016</a:t>
+            </a:fld>
+            <a:endParaRPr lang="fr-FR" dirty="0"/>
+          </a:p>
+        </p:txBody>
+      </p:sp>
+      <p:sp>
+        <p:nvSpPr>
+          <p:cNvPr id="5" name="Espace réservé du pied de page 4"/>
+          <p:cNvSpPr>
+            <a:spLocks noGrp="1"/>
+          </p:cNvSpPr>
+          <p:nvPr>
+            <p:ph type="ftr" sz="quarter" idx="11"/>
+          </p:nvPr>
+        </p:nvSpPr>
+        <p:spPr/>
+        <p:txBody>
+          <a:bodyPr/>
+          <a:lstStyle/>
+          <a:p>
+            <a:r>
+              <a:rPr lang="fr-FR" dirty="0"/>
+              <a:t>Galt – PI S5 IL – Itération </a:t>
+            </a:r>
+            <a:r>
+              <a:rPr lang="fr-FR" dirty="0" smtClean="0"/>
+              <a:t>2</a:t>
+            </a:r>
+            <a:endParaRPr lang="fr-FR" dirty="0"/>
+          </a:p>
+        </p:txBody>
+      </p:sp>
+      <p:sp>
+        <p:nvSpPr>
+          <p:cNvPr id="6" name="Espace réservé du numéro de diapositive 5"/>
+          <p:cNvSpPr>
+            <a:spLocks noGrp="1"/>
+          </p:cNvSpPr>
+          <p:nvPr>
+            <p:ph type="sldNum" sz="quarter" idx="12"/>
+          </p:nvPr>
+        </p:nvSpPr>
+        <p:spPr/>
+        <p:txBody>
+          <a:bodyPr/>
+          <a:lstStyle/>
+          <a:p>
+            <a:fld id="{CE35DAD6-85E4-415C-A280-4771D4FE3E59}" type="slidenum">
+              <a:rPr lang="fr-FR" smtClean="0"/>
+              <a:pPr/>
+              <a:t>5</a:t>
+            </a:fld>
+            <a:endParaRPr lang="fr-FR" dirty="0"/>
+          </a:p>
+        </p:txBody>
+      </p:sp>
+      <p:sp>
+        <p:nvSpPr>
+          <p:cNvPr id="9" name="Espace réservé du contenu 8"/>
+          <p:cNvSpPr>
+            <a:spLocks noGrp="1"/>
+          </p:cNvSpPr>
+          <p:nvPr>
+            <p:ph sz="half" idx="2"/>
+          </p:nvPr>
+        </p:nvSpPr>
+        <p:spPr/>
+        <p:txBody>
+          <a:bodyPr>
+            <a:noAutofit/>
+          </a:bodyPr>
+          <a:lstStyle/>
+          <a:p>
+            <a:pPr defTabSz="361950">
+              <a:lnSpc>
+                <a:spcPct val="100000"/>
+              </a:lnSpc>
+            </a:pPr>
+            <a:r>
+              <a:rPr lang="fr-FR" dirty="0"/>
+              <a:t>	Guillaume</a:t>
+            </a:r>
+          </a:p>
+        </p:txBody>
+      </p:sp>
+    </p:spTree>
+    <p:extLst>
+      <p:ext uri="{BB962C8B-B14F-4D97-AF65-F5344CB8AC3E}">
+        <p14:creationId xmlns:p14="http://schemas.microsoft.com/office/powerpoint/2010/main" val="308092647"/>
+      </p:ext>
+    </p:extLst>
+  </p:cSld>
+  <p:clrMapOvr>
+    <a:masterClrMapping/>
+  </p:clrMapOvr>
+  <p:timing>
+    <p:tnLst>
+      <p:par>
+        <p:cTn id="1" dur="indefinite" restart="never" nodeType="tmRoot"/>
+      </p:par>
+    </p:tnLst>
+  </p:timing>
+</p:sld>
+</file>
+
+<file path=ppt/slides/slide6.xml><?xml version="1.0" encoding="utf-8"?>
+<p:sld xmlns:a="http://schemas.openxmlformats.org/drawingml/2006/main" xmlns:r="http://schemas.openxmlformats.org/officeDocument/2006/relationships" xmlns:p="http://schemas.openxmlformats.org/presentationml/2006/main">
+  <p:cSld>
+    <p:bg>
+      <p:bgRef idx="1001">
+        <a:schemeClr val="bg1"/>
+      </p:bgRef>
+    </p:bg>
+    <p:spTree>
+      <p:nvGrpSpPr>
+        <p:cNvPr id="1" name=""/>
+        <p:cNvGrpSpPr/>
+        <p:nvPr/>
+      </p:nvGrpSpPr>
+      <p:grpSpPr>
+        <a:xfrm>
+          <a:off x="0" y="0"/>
+          <a:ext cx="0" cy="0"/>
+          <a:chOff x="0" y="0"/>
+          <a:chExt cx="0" cy="0"/>
+        </a:xfrm>
+      </p:grpSpPr>
+      <p:sp>
+        <p:nvSpPr>
+          <p:cNvPr id="2" name="Titre 1"/>
+          <p:cNvSpPr>
+            <a:spLocks noGrp="1"/>
+          </p:cNvSpPr>
+          <p:nvPr>
+            <p:ph type="title"/>
+          </p:nvPr>
+        </p:nvSpPr>
+        <p:spPr/>
+        <p:txBody>
+          <a:bodyPr>
+            <a:normAutofit fontScale="90000"/>
+          </a:bodyPr>
+          <a:lstStyle/>
+          <a:p>
+            <a:r>
+              <a:rPr lang="fr-FR" dirty="0"/>
+              <a:t>	Le graphe de dépendances</a:t>
+            </a:r>
+          </a:p>
+        </p:txBody>
+      </p:sp>
+      <p:sp>
+        <p:nvSpPr>
+          <p:cNvPr id="4" name="Espace réservé de la date 3"/>
+          <p:cNvSpPr>
+            <a:spLocks noGrp="1"/>
+          </p:cNvSpPr>
+          <p:nvPr>
+            <p:ph type="dt" sz="half" idx="10"/>
+          </p:nvPr>
+        </p:nvSpPr>
+        <p:spPr/>
+        <p:txBody>
+          <a:bodyPr/>
+          <a:lstStyle/>
+          <a:p>
+            <a:fld id="{9905D2EB-A0C9-4269-BED7-F488BFFF1574}" type="datetime1">
+              <a:rPr lang="fr-FR" smtClean="0"/>
+              <a:pPr/>
+              <a:t>20/12/2016</a:t>
+            </a:fld>
+            <a:endParaRPr lang="fr-FR" dirty="0"/>
+          </a:p>
+        </p:txBody>
+      </p:sp>
+      <p:sp>
+        <p:nvSpPr>
+          <p:cNvPr id="5" name="Espace réservé du pied de page 4"/>
+          <p:cNvSpPr>
+            <a:spLocks noGrp="1"/>
+          </p:cNvSpPr>
+          <p:nvPr>
+            <p:ph type="ftr" sz="quarter" idx="11"/>
+          </p:nvPr>
+        </p:nvSpPr>
+        <p:spPr/>
+        <p:txBody>
+          <a:bodyPr/>
+          <a:lstStyle/>
+          <a:p>
+            <a:r>
+              <a:rPr lang="fr-FR" dirty="0"/>
+              <a:t>Galt – PI S5 IL – Itération </a:t>
+            </a:r>
+            <a:r>
+              <a:rPr lang="fr-FR" dirty="0" smtClean="0"/>
+              <a:t>2</a:t>
+            </a:r>
+            <a:endParaRPr lang="fr-FR" dirty="0"/>
+          </a:p>
+        </p:txBody>
+      </p:sp>
+      <p:sp>
+        <p:nvSpPr>
+          <p:cNvPr id="6" name="Espace réservé du numéro de diapositive 5"/>
+          <p:cNvSpPr>
+            <a:spLocks noGrp="1"/>
+          </p:cNvSpPr>
+          <p:nvPr>
+            <p:ph type="sldNum" sz="quarter" idx="12"/>
+          </p:nvPr>
+        </p:nvSpPr>
+        <p:spPr/>
+        <p:txBody>
+          <a:bodyPr/>
+          <a:lstStyle/>
+          <a:p>
+            <a:fld id="{CE35DAD6-85E4-415C-A280-4771D4FE3E59}" type="slidenum">
+              <a:rPr lang="fr-FR" smtClean="0"/>
+              <a:pPr/>
+              <a:t>6</a:t>
+            </a:fld>
+            <a:endParaRPr lang="fr-FR" dirty="0"/>
+          </a:p>
+        </p:txBody>
+      </p:sp>
+      <p:sp>
+        <p:nvSpPr>
+          <p:cNvPr id="8" name="Espace réservé du contenu 7"/>
+          <p:cNvSpPr>
+            <a:spLocks noGrp="1"/>
+          </p:cNvSpPr>
+          <p:nvPr>
+            <p:ph sz="half" idx="2"/>
+          </p:nvPr>
+        </p:nvSpPr>
+        <p:spPr/>
+        <p:txBody>
+          <a:bodyPr>
+            <a:normAutofit/>
+          </a:bodyPr>
+          <a:lstStyle/>
+          <a:p>
+            <a:pPr defTabSz="361950">
+              <a:lnSpc>
+                <a:spcPct val="100000"/>
+              </a:lnSpc>
+            </a:pPr>
+            <a:r>
+              <a:rPr lang="fr-FR" dirty="0"/>
+              <a:t>	Léo</a:t>
+            </a:r>
+          </a:p>
+        </p:txBody>
+      </p:sp>
+      <p:sp>
+        <p:nvSpPr>
+          <p:cNvPr id="3" name="Espace réservé du contenu 2"/>
+          <p:cNvSpPr>
+            <a:spLocks noGrp="1"/>
+          </p:cNvSpPr>
+          <p:nvPr>
+            <p:ph idx="1"/>
+          </p:nvPr>
+        </p:nvSpPr>
+        <p:spPr/>
+        <p:txBody>
+          <a:bodyPr/>
+          <a:lstStyle/>
+          <a:p>
+            <a:endParaRPr lang="fr-FR"/>
+          </a:p>
+        </p:txBody>
+      </p:sp>
+    </p:spTree>
+    <p:extLst>
+      <p:ext uri="{BB962C8B-B14F-4D97-AF65-F5344CB8AC3E}">
+        <p14:creationId xmlns:p14="http://schemas.microsoft.com/office/powerpoint/2010/main" val="98134310"/>
+      </p:ext>
+    </p:extLst>
+  </p:cSld>
+  <p:clrMapOvr>
+    <a:overrideClrMapping bg1="lt1" tx1="dk1" bg2="lt2" tx2="dk2" accent1="accent1" accent2="accent2" accent3="accent3" accent4="accent4" accent5="accent5" accent6="accent6" hlink="hlink" folHlink="folHlink"/>
+  </p:clrMapOvr>
+  <p:timing>
+    <p:tnLst>
+      <p:par>
+        <p:cTn id="1" dur="indefinite" restart="never" nodeType="tmRoot"/>
+      </p:par>
+    </p:tnLst>
+  </p:timing>
+</p:sld>
+</file>
+
+<file path=ppt/slides/slide7.xml><?xml version="1.0" encoding="utf-8"?>
+<p:sld xmlns:a="http://schemas.openxmlformats.org/drawingml/2006/main" xmlns:r="http://schemas.openxmlformats.org/officeDocument/2006/relationships" xmlns:p="http://schemas.openxmlformats.org/presentationml/2006/main">
+  <p:cSld>
+    <p:spTree>
+      <p:nvGrpSpPr>
+        <p:cNvPr id="1" name=""/>
+        <p:cNvGrpSpPr/>
+        <p:nvPr/>
+      </p:nvGrpSpPr>
+      <p:grpSpPr>
+        <a:xfrm>
+          <a:off x="0" y="0"/>
+          <a:ext cx="0" cy="0"/>
+          <a:chOff x="0" y="0"/>
+          <a:chExt cx="0" cy="0"/>
+        </a:xfrm>
+      </p:grpSpPr>
+      <p:sp>
+        <p:nvSpPr>
+          <p:cNvPr id="2" name="Titre 1"/>
+          <p:cNvSpPr>
+            <a:spLocks noGrp="1"/>
+          </p:cNvSpPr>
+          <p:nvPr>
+            <p:ph type="title"/>
+          </p:nvPr>
+        </p:nvSpPr>
+        <p:spPr/>
+        <p:txBody>
+          <a:bodyPr/>
+          <a:lstStyle/>
+          <a:p>
+            <a:r>
+              <a:rPr lang="fr-FR" dirty="0" smtClean="0"/>
+              <a:t>	Vision sur l’itération </a:t>
+            </a:r>
+            <a:r>
+              <a:rPr lang="fr-FR" dirty="0" smtClean="0"/>
+              <a:t>3</a:t>
+            </a:r>
+            <a:endParaRPr lang="fr-FR" dirty="0"/>
+          </a:p>
+        </p:txBody>
+      </p:sp>
+      <p:sp>
+        <p:nvSpPr>
+          <p:cNvPr id="4" name="Espace réservé de la date 3"/>
+          <p:cNvSpPr>
+            <a:spLocks noGrp="1"/>
+          </p:cNvSpPr>
+          <p:nvPr>
+            <p:ph type="dt" sz="half" idx="10"/>
+          </p:nvPr>
+        </p:nvSpPr>
+        <p:spPr/>
+        <p:txBody>
+          <a:bodyPr/>
+          <a:lstStyle/>
+          <a:p>
+            <a:fld id="{9905D2EB-A0C9-4269-BED7-F488BFFF1574}" type="datetime1">
+              <a:rPr lang="fr-FR" smtClean="0"/>
+              <a:pPr/>
+              <a:t>20/12/2016</a:t>
+            </a:fld>
+            <a:endParaRPr lang="fr-FR" dirty="0"/>
+          </a:p>
+        </p:txBody>
+      </p:sp>
+      <p:sp>
+        <p:nvSpPr>
+          <p:cNvPr id="5" name="Espace réservé du pied de page 4"/>
+          <p:cNvSpPr>
+            <a:spLocks noGrp="1"/>
+          </p:cNvSpPr>
+          <p:nvPr>
+            <p:ph type="ftr" sz="quarter" idx="11"/>
+          </p:nvPr>
+        </p:nvSpPr>
+        <p:spPr/>
+        <p:txBody>
+          <a:bodyPr/>
+          <a:lstStyle/>
+          <a:p>
+            <a:r>
+              <a:rPr lang="fr-FR" dirty="0" smtClean="0"/>
+              <a:t>Galt – PI S5 IL – Itération </a:t>
+            </a:r>
+            <a:r>
+              <a:rPr lang="fr-FR" dirty="0" smtClean="0"/>
+              <a:t>2</a:t>
+            </a:r>
+            <a:endParaRPr lang="fr-FR" dirty="0"/>
+          </a:p>
+        </p:txBody>
+      </p:sp>
+      <p:sp>
+        <p:nvSpPr>
+          <p:cNvPr id="6" name="Espace réservé du numéro de diapositive 5"/>
+          <p:cNvSpPr>
+            <a:spLocks noGrp="1"/>
+          </p:cNvSpPr>
+          <p:nvPr>
+            <p:ph type="sldNum" sz="quarter" idx="12"/>
+          </p:nvPr>
+        </p:nvSpPr>
+        <p:spPr/>
+        <p:txBody>
+          <a:bodyPr/>
+          <a:lstStyle/>
+          <a:p>
+            <a:fld id="{CE35DAD6-85E4-415C-A280-4771D4FE3E59}" type="slidenum">
+              <a:rPr lang="fr-FR" smtClean="0"/>
+              <a:pPr/>
+              <a:t>7</a:t>
             </a:fld>
             <a:endParaRPr lang="fr-FR" dirty="0"/>
           </a:p>
@@ -3731,7 +4847,7 @@
               <a:buSzPct val="120000"/>
               <a:buFontTx/>
               <a:buBlip>
-                <a:blip r:embed="rId3"/>
+                <a:blip r:embed="rId2"/>
               </a:buBlip>
               <a:defRPr lang="fr-FR" sz="1800" strike="noStrike" kern="1200" spc="-1" dirty="0" smtClean="0">
                 <a:solidFill>
@@ -3923,9 +5039,163 @@
             </a:lvl9pPr>
           </a:lstStyle>
           <a:p>
-            <a:pPr marL="360" indent="0">
-              <a:buNone/>
+            <a:pPr marL="361800" indent="-361440"/>
+            <a:r>
+              <a:rPr lang="fr-FR" sz="2000" dirty="0" smtClean="0">
+                <a:solidFill>
+                  <a:srgbClr val="2B5259"/>
+                </a:solidFill>
+              </a:rPr>
+              <a:t>Envoi </a:t>
+            </a:r>
+            <a:r>
+              <a:rPr lang="fr-FR" sz="2000" dirty="0">
+                <a:solidFill>
+                  <a:srgbClr val="2B5259"/>
+                </a:solidFill>
+              </a:rPr>
+              <a:t>des informations de packages du back au front</a:t>
+            </a:r>
+            <a:endParaRPr lang="fr-FR" sz="2000" dirty="0">
+              <a:solidFill>
+                <a:srgbClr val="000000"/>
+              </a:solidFill>
+            </a:endParaRPr>
+          </a:p>
+          <a:p>
+            <a:pPr marL="361800" indent="-361440"/>
+            <a:r>
+              <a:rPr lang="fr-FR" sz="2000" dirty="0">
+                <a:solidFill>
+                  <a:srgbClr val="2B5259"/>
+                </a:solidFill>
+              </a:rPr>
+              <a:t>Changer la version du package </a:t>
+            </a:r>
+            <a:r>
+              <a:rPr lang="fr-FR" sz="2000" dirty="0" smtClean="0">
+                <a:solidFill>
+                  <a:srgbClr val="2B5259"/>
+                </a:solidFill>
+              </a:rPr>
+              <a:t>affiché</a:t>
+            </a:r>
+          </a:p>
+          <a:p>
+            <a:pPr marL="361800" indent="-361440"/>
+            <a:r>
+              <a:rPr lang="fr-FR" sz="2000" dirty="0" smtClean="0">
+                <a:solidFill>
+                  <a:srgbClr val="2B5259"/>
+                </a:solidFill>
+              </a:rPr>
+              <a:t>Afficher les nouvelles versions et </a:t>
+            </a:r>
+            <a:r>
+              <a:rPr lang="fr-FR" sz="2000" smtClean="0">
+                <a:solidFill>
+                  <a:srgbClr val="2B5259"/>
+                </a:solidFill>
+              </a:rPr>
+              <a:t>les conflits</a:t>
+            </a:r>
+            <a:endParaRPr lang="fr-FR" sz="2000" dirty="0">
+              <a:solidFill>
+                <a:srgbClr val="000000"/>
+              </a:solidFill>
+            </a:endParaRPr>
+          </a:p>
+          <a:p>
+            <a:pPr marL="361800" indent="-361440"/>
+            <a:r>
+              <a:rPr lang="fr-FR" sz="2000" dirty="0">
+                <a:solidFill>
+                  <a:srgbClr val="2B5259"/>
+                </a:solidFill>
+              </a:rPr>
+              <a:t>Multiples détails sur le graphe : </a:t>
+            </a:r>
+            <a:endParaRPr lang="fr-FR" sz="2000" dirty="0" smtClean="0">
+              <a:solidFill>
+                <a:srgbClr val="2B5259"/>
+              </a:solidFill>
+            </a:endParaRPr>
+          </a:p>
+          <a:p>
+            <a:pPr marL="622300" indent="-360363">
+              <a:lnSpc>
+                <a:spcPct val="100000"/>
+              </a:lnSpc>
+              <a:buFont typeface="Wingdings" panose="05000000000000000000" pitchFamily="2" charset="2"/>
+              <a:buChar char="§"/>
             </a:pPr>
+            <a:r>
+              <a:rPr lang="fr-FR" sz="2000" dirty="0" smtClean="0">
+                <a:solidFill>
+                  <a:srgbClr val="2B5259"/>
+                </a:solidFill>
+              </a:rPr>
+              <a:t>Autres </a:t>
+            </a:r>
+            <a:r>
+              <a:rPr lang="fr-FR" sz="2000" dirty="0">
+                <a:solidFill>
+                  <a:srgbClr val="2B5259"/>
+                </a:solidFill>
+              </a:rPr>
+              <a:t>formes
+</a:t>
+            </a:r>
+            <a:r>
+              <a:rPr lang="fr-FR" sz="2000" dirty="0" smtClean="0">
+                <a:solidFill>
+                  <a:srgbClr val="2B5259"/>
+                </a:solidFill>
+              </a:rPr>
+              <a:t>Différentes </a:t>
+            </a:r>
+            <a:r>
+              <a:rPr lang="fr-FR" sz="2000" dirty="0">
+                <a:solidFill>
+                  <a:srgbClr val="2B5259"/>
+                </a:solidFill>
+              </a:rPr>
+              <a:t>couleurs
+</a:t>
+            </a:r>
+            <a:r>
+              <a:rPr lang="fr-FR" sz="2000" dirty="0" smtClean="0">
+                <a:solidFill>
+                  <a:srgbClr val="2B5259"/>
+                </a:solidFill>
+              </a:rPr>
+              <a:t>Légende</a:t>
+            </a:r>
+          </a:p>
+          <a:p>
+            <a:pPr marL="622300" indent="-360363">
+              <a:lnSpc>
+                <a:spcPct val="100000"/>
+              </a:lnSpc>
+              <a:buFont typeface="Wingdings" panose="05000000000000000000" pitchFamily="2" charset="2"/>
+              <a:buChar char="§"/>
+            </a:pPr>
+            <a:r>
+              <a:rPr lang="fr-FR" sz="2000" dirty="0" smtClean="0">
+                <a:solidFill>
+                  <a:srgbClr val="2B5259"/>
+                </a:solidFill>
+              </a:rPr>
+              <a:t>Pouvoir </a:t>
+            </a:r>
+            <a:r>
+              <a:rPr lang="fr-FR" sz="2000" dirty="0">
+                <a:solidFill>
+                  <a:srgbClr val="2B5259"/>
+                </a:solidFill>
+              </a:rPr>
+              <a:t>désactiver le filtre</a:t>
+            </a:r>
             <a:endParaRPr lang="fr-FR" sz="2000" dirty="0">
               <a:solidFill>
                 <a:srgbClr val="000000"/>
@@ -3944,10 +5214,17 @@
   <p:clrMapOvr>
     <a:masterClrMapping/>
   </p:clrMapOvr>
+  <p:timing>
+    <p:tnLst>
+      <p:par>
+        <p:cTn id="1" dur="indefinite" restart="never" nodeType="tmRoot"/>
+      </p:par>
+    </p:tnLst>
+  </p:timing>
 </p:sld>
 </file>
 
-<file path=ppt/slides/slide4.xml><?xml version="1.0" encoding="utf-8"?>
+<file path=ppt/slides/slide8.xml><?xml version="1.0" encoding="utf-8"?>
 <p:sld xmlns:a="http://schemas.openxmlformats.org/drawingml/2006/main" xmlns:r="http://schemas.openxmlformats.org/officeDocument/2006/relationships" xmlns:p="http://schemas.openxmlformats.org/presentationml/2006/main">
   <p:cSld>
     <p:spTree>
@@ -3966,361 +5243,6 @@
       </p:grpSpPr>
       <p:sp>
         <p:nvSpPr>
-          <p:cNvPr id="2" name="Titre 1"/>
-          <p:cNvSpPr>
-            <a:spLocks noGrp="1"/>
-          </p:cNvSpPr>
-          <p:nvPr>
-            <p:ph type="title"/>
-          </p:nvPr>
-        </p:nvSpPr>
-        <p:spPr/>
-        <p:txBody>
-          <a:bodyPr/>
-          <a:lstStyle/>
-          <a:p>
-            <a:r>
-              <a:rPr lang="fr-FR" dirty="0"/>
-              <a:t>	Objectifs atteints</a:t>
-            </a:r>
-          </a:p>
-        </p:txBody>
-      </p:sp>
-      <p:sp>
-        <p:nvSpPr>
-          <p:cNvPr id="4" name="Espace réservé de la date 3"/>
-          <p:cNvSpPr>
-            <a:spLocks noGrp="1"/>
-          </p:cNvSpPr>
-          <p:nvPr>
-            <p:ph type="dt" sz="half" idx="10"/>
-          </p:nvPr>
-        </p:nvSpPr>
-        <p:spPr/>
-        <p:txBody>
-          <a:bodyPr/>
-          <a:lstStyle/>
-          <a:p>
-            <a:fld id="{9905D2EB-A0C9-4269-BED7-F488BFFF1574}" type="datetime1">
-              <a:rPr lang="fr-FR" smtClean="0"/>
-              <a:pPr/>
-              <a:t>20/01/2017</a:t>
-            </a:fld>
-            <a:endParaRPr lang="fr-FR" dirty="0"/>
-          </a:p>
-        </p:txBody>
-      </p:sp>
-      <p:sp>
-        <p:nvSpPr>
-          <p:cNvPr id="5" name="Espace réservé du pied de page 4"/>
-          <p:cNvSpPr>
-            <a:spLocks noGrp="1"/>
-          </p:cNvSpPr>
-          <p:nvPr>
-            <p:ph type="ftr" sz="quarter" idx="11"/>
-          </p:nvPr>
-        </p:nvSpPr>
-        <p:spPr/>
-        <p:txBody>
-          <a:bodyPr/>
-          <a:lstStyle/>
-          <a:p>
-            <a:r>
-              <a:rPr lang="fr-FR" dirty="0"/>
-              <a:t>Galt – PI S5 IL – Itération 2</a:t>
-            </a:r>
-          </a:p>
-        </p:txBody>
-      </p:sp>
-      <p:sp>
-        <p:nvSpPr>
-          <p:cNvPr id="6" name="Espace réservé du numéro de diapositive 5"/>
-          <p:cNvSpPr>
-            <a:spLocks noGrp="1"/>
-          </p:cNvSpPr>
-          <p:nvPr>
-            <p:ph type="sldNum" sz="quarter" idx="12"/>
-          </p:nvPr>
-        </p:nvSpPr>
-        <p:spPr/>
-        <p:txBody>
-          <a:bodyPr/>
-          <a:lstStyle/>
-          <a:p>
-            <a:fld id="{CE35DAD6-85E4-415C-A280-4771D4FE3E59}" type="slidenum">
-              <a:rPr lang="fr-FR" smtClean="0"/>
-              <a:pPr/>
-              <a:t>4</a:t>
-            </a:fld>
-            <a:endParaRPr lang="fr-FR" dirty="0"/>
-          </a:p>
-        </p:txBody>
-      </p:sp>
-      <p:sp>
-        <p:nvSpPr>
-          <p:cNvPr id="7" name="Espace réservé du contenu 2"/>
-          <p:cNvSpPr txBox="1">
-            <a:spLocks noGrp="1"/>
-          </p:cNvSpPr>
-          <p:nvPr>
-            <p:ph idx="1"/>
-          </p:nvPr>
-        </p:nvSpPr>
-        <p:spPr>
-          <a:prstGeom prst="rect">
-            <a:avLst/>
-          </a:prstGeom>
-        </p:spPr>
-        <p:txBody>
-          <a:bodyPr vert="horz" lIns="91440" tIns="45720" rIns="91440" bIns="45720" rtlCol="0">
-            <a:normAutofit/>
-          </a:bodyPr>
-          <a:lstStyle>
-            <a:lvl1pPr marL="361950" indent="-361950" algn="l" defTabSz="756026" rtl="0" eaLnBrk="1" latinLnBrk="0" hangingPunct="1">
-              <a:lnSpc>
-                <a:spcPct val="200000"/>
-              </a:lnSpc>
-              <a:spcBef>
-                <a:spcPts val="827"/>
-              </a:spcBef>
-              <a:buSzPct val="120000"/>
-              <a:buFontTx/>
-              <a:buBlip>
-                <a:blip r:embed="rId3"/>
-              </a:buBlip>
-              <a:defRPr lang="fr-FR" sz="1800" strike="noStrike" kern="1200" spc="-1" dirty="0" smtClean="0">
-                <a:solidFill>
-                  <a:schemeClr val="accent5">
-                    <a:lumMod val="50000"/>
-                  </a:schemeClr>
-                </a:solidFill>
-                <a:uFill>
-                  <a:solidFill>
-                    <a:srgbClr val="FFFFFF"/>
-                  </a:solidFill>
-                </a:uFill>
-                <a:latin typeface="Leelawadee" panose="020B0502040204020203" pitchFamily="34" charset="-34"/>
-                <a:ea typeface="+mn-ea"/>
-                <a:cs typeface="Leelawadee" panose="020B0502040204020203" pitchFamily="34" charset="-34"/>
-              </a:defRPr>
-            </a:lvl1pPr>
-            <a:lvl2pPr marL="567019" indent="-189006" algn="l" defTabSz="756026" rtl="0" eaLnBrk="1" latinLnBrk="0" hangingPunct="1">
-              <a:lnSpc>
-                <a:spcPct val="90000"/>
-              </a:lnSpc>
-              <a:spcBef>
-                <a:spcPts val="413"/>
-              </a:spcBef>
-              <a:buFont typeface="Arial" panose="020B0604020202020204" pitchFamily="34" charset="0"/>
-              <a:buChar char="•"/>
-              <a:defRPr lang="fr-FR" sz="1800" strike="noStrike" kern="1200" spc="-1" dirty="0" smtClean="0">
-                <a:solidFill>
-                  <a:schemeClr val="accent5">
-                    <a:lumMod val="50000"/>
-                  </a:schemeClr>
-                </a:solidFill>
-                <a:uFill>
-                  <a:solidFill>
-                    <a:srgbClr val="FFFFFF"/>
-                  </a:solidFill>
-                </a:uFill>
-                <a:latin typeface="Leelawadee" panose="020B0502040204020203" pitchFamily="34" charset="-34"/>
-                <a:ea typeface="+mn-ea"/>
-                <a:cs typeface="Leelawadee" panose="020B0502040204020203" pitchFamily="34" charset="-34"/>
-              </a:defRPr>
-            </a:lvl2pPr>
-            <a:lvl3pPr marL="945032" indent="-189006" algn="l" defTabSz="756026" rtl="0" eaLnBrk="1" latinLnBrk="0" hangingPunct="1">
-              <a:lnSpc>
-                <a:spcPct val="90000"/>
-              </a:lnSpc>
-              <a:spcBef>
-                <a:spcPts val="413"/>
-              </a:spcBef>
-              <a:buFont typeface="Arial" panose="020B0604020202020204" pitchFamily="34" charset="0"/>
-              <a:buChar char="•"/>
-              <a:defRPr lang="fr-FR" sz="1800" strike="noStrike" kern="1200" spc="-1" dirty="0" smtClean="0">
-                <a:solidFill>
-                  <a:schemeClr val="accent5">
-                    <a:lumMod val="50000"/>
-                  </a:schemeClr>
-                </a:solidFill>
-                <a:uFill>
-                  <a:solidFill>
-                    <a:srgbClr val="FFFFFF"/>
-                  </a:solidFill>
-                </a:uFill>
-                <a:latin typeface="Leelawadee" panose="020B0502040204020203" pitchFamily="34" charset="-34"/>
-                <a:ea typeface="+mn-ea"/>
-                <a:cs typeface="Leelawadee" panose="020B0502040204020203" pitchFamily="34" charset="-34"/>
-              </a:defRPr>
-            </a:lvl3pPr>
-            <a:lvl4pPr marL="1323045" indent="-189006" algn="l" defTabSz="756026" rtl="0" eaLnBrk="1" latinLnBrk="0" hangingPunct="1">
-              <a:lnSpc>
-                <a:spcPct val="90000"/>
-              </a:lnSpc>
-              <a:spcBef>
-                <a:spcPts val="413"/>
-              </a:spcBef>
-              <a:buFont typeface="Arial" panose="020B0604020202020204" pitchFamily="34" charset="0"/>
-              <a:buChar char="•"/>
-              <a:defRPr lang="fr-FR" sz="1800" strike="noStrike" kern="1200" spc="-1" dirty="0" smtClean="0">
-                <a:solidFill>
-                  <a:schemeClr val="accent5">
-                    <a:lumMod val="50000"/>
-                  </a:schemeClr>
-                </a:solidFill>
-                <a:uFill>
-                  <a:solidFill>
-                    <a:srgbClr val="FFFFFF"/>
-                  </a:solidFill>
-                </a:uFill>
-                <a:latin typeface="Leelawadee" panose="020B0502040204020203" pitchFamily="34" charset="-34"/>
-                <a:ea typeface="+mn-ea"/>
-                <a:cs typeface="Leelawadee" panose="020B0502040204020203" pitchFamily="34" charset="-34"/>
-              </a:defRPr>
-            </a:lvl4pPr>
-            <a:lvl5pPr marL="1701058" indent="-189006" algn="l" defTabSz="756026" rtl="0" eaLnBrk="1" latinLnBrk="0" hangingPunct="1">
-              <a:lnSpc>
-                <a:spcPct val="90000"/>
-              </a:lnSpc>
-              <a:spcBef>
-                <a:spcPts val="413"/>
-              </a:spcBef>
-              <a:buFont typeface="Arial" panose="020B0604020202020204" pitchFamily="34" charset="0"/>
-              <a:buChar char="•"/>
-              <a:defRPr lang="fr-FR" sz="1800" strike="noStrike" kern="1200" spc="-1" dirty="0">
-                <a:solidFill>
-                  <a:schemeClr val="accent5">
-                    <a:lumMod val="50000"/>
-                  </a:schemeClr>
-                </a:solidFill>
-                <a:uFill>
-                  <a:solidFill>
-                    <a:srgbClr val="FFFFFF"/>
-                  </a:solidFill>
-                </a:uFill>
-                <a:latin typeface="Leelawadee" panose="020B0502040204020203" pitchFamily="34" charset="-34"/>
-                <a:ea typeface="+mn-ea"/>
-                <a:cs typeface="Leelawadee" panose="020B0502040204020203" pitchFamily="34" charset="-34"/>
-              </a:defRPr>
-            </a:lvl5pPr>
-            <a:lvl6pPr marL="2079071" indent="-189006" algn="l" defTabSz="756026" rtl="0" eaLnBrk="1" latinLnBrk="0" hangingPunct="1">
-              <a:lnSpc>
-                <a:spcPct val="90000"/>
-              </a:lnSpc>
-              <a:spcBef>
-                <a:spcPts val="413"/>
-              </a:spcBef>
-              <a:buFont typeface="Arial" panose="020B0604020202020204" pitchFamily="34" charset="0"/>
-              <a:buChar char="•"/>
-              <a:defRPr sz="1488" kern="1200">
-                <a:solidFill>
-                  <a:schemeClr val="tx1"/>
-                </a:solidFill>
-                <a:latin typeface="+mn-lt"/>
-                <a:ea typeface="+mn-ea"/>
-                <a:cs typeface="+mn-cs"/>
-              </a:defRPr>
-            </a:lvl6pPr>
-            <a:lvl7pPr marL="2457084" indent="-189006" algn="l" defTabSz="756026" rtl="0" eaLnBrk="1" latinLnBrk="0" hangingPunct="1">
-              <a:lnSpc>
-                <a:spcPct val="90000"/>
-              </a:lnSpc>
-              <a:spcBef>
-                <a:spcPts val="413"/>
-              </a:spcBef>
-              <a:buFont typeface="Arial" panose="020B0604020202020204" pitchFamily="34" charset="0"/>
-              <a:buChar char="•"/>
-              <a:defRPr sz="1488" kern="1200">
-                <a:solidFill>
-                  <a:schemeClr val="tx1"/>
-                </a:solidFill>
-                <a:latin typeface="+mn-lt"/>
-                <a:ea typeface="+mn-ea"/>
-                <a:cs typeface="+mn-cs"/>
-              </a:defRPr>
-            </a:lvl7pPr>
-            <a:lvl8pPr marL="2835097" indent="-189006" algn="l" defTabSz="756026" rtl="0" eaLnBrk="1" latinLnBrk="0" hangingPunct="1">
-              <a:lnSpc>
-                <a:spcPct val="90000"/>
-              </a:lnSpc>
-              <a:spcBef>
-                <a:spcPts val="413"/>
-              </a:spcBef>
-              <a:buFont typeface="Arial" panose="020B0604020202020204" pitchFamily="34" charset="0"/>
-              <a:buChar char="•"/>
-              <a:defRPr sz="1488" kern="1200">
-                <a:solidFill>
-                  <a:schemeClr val="tx1"/>
-                </a:solidFill>
-                <a:latin typeface="+mn-lt"/>
-                <a:ea typeface="+mn-ea"/>
-                <a:cs typeface="+mn-cs"/>
-              </a:defRPr>
-            </a:lvl8pPr>
-            <a:lvl9pPr marL="3213110" indent="-189006" algn="l" defTabSz="756026" rtl="0" eaLnBrk="1" latinLnBrk="0" hangingPunct="1">
-              <a:lnSpc>
-                <a:spcPct val="90000"/>
-              </a:lnSpc>
-              <a:spcBef>
-                <a:spcPts val="413"/>
-              </a:spcBef>
-              <a:buFont typeface="Arial" panose="020B0604020202020204" pitchFamily="34" charset="0"/>
-              <a:buChar char="•"/>
-              <a:defRPr sz="1488" kern="1200">
-                <a:solidFill>
-                  <a:schemeClr val="tx1"/>
-                </a:solidFill>
-                <a:latin typeface="+mn-lt"/>
-                <a:ea typeface="+mn-ea"/>
-                <a:cs typeface="+mn-cs"/>
-              </a:defRPr>
-            </a:lvl9pPr>
-          </a:lstStyle>
-          <a:p>
-            <a:pPr marL="360" indent="0">
-              <a:buNone/>
-            </a:pPr>
-            <a:endParaRPr lang="fr-FR" sz="2000" dirty="0">
-              <a:solidFill>
-                <a:srgbClr val="000000"/>
-              </a:solidFill>
-            </a:endParaRPr>
-          </a:p>
-        </p:txBody>
-      </p:sp>
-    </p:spTree>
-    <p:extLst>
-      <p:ext uri="{BB962C8B-B14F-4D97-AF65-F5344CB8AC3E}">
-        <p14:creationId xmlns:p14="http://schemas.microsoft.com/office/powerpoint/2010/main" val="2106739983"/>
-      </p:ext>
-    </p:extLst>
-  </p:cSld>
-  <p:clrMapOvr>
-    <a:masterClrMapping/>
-  </p:clrMapOvr>
-</p:sld>
-</file>
-
-<file path=ppt/slides/slide5.xml><?xml version="1.0" encoding="utf-8"?>
-<p:sld xmlns:a="http://schemas.openxmlformats.org/drawingml/2006/main" xmlns:r="http://schemas.openxmlformats.org/officeDocument/2006/relationships" xmlns:p="http://schemas.openxmlformats.org/presentationml/2006/main">
-  <p:cSld>
-    <p:spTree>
-      <p:nvGrpSpPr>
-        <p:cNvPr id="1" name=""/>
-        <p:cNvGrpSpPr/>
-        <p:nvPr/>
-      </p:nvGrpSpPr>
-      <p:grpSpPr>
-        <a:xfrm>
-          <a:off x="0" y="0"/>
-          <a:ext cx="0" cy="0"/>
-          <a:chOff x="0" y="0"/>
-          <a:chExt cx="0" cy="0"/>
-        </a:xfrm>
-      </p:grpSpPr>
-      <p:sp>
-        <p:nvSpPr>
           <p:cNvPr id="10" name="ZoneTexte 9"/>
           <p:cNvSpPr txBox="1"/>
           <p:nvPr/>
@@ -4343,7 +5265,7 @@
           <a:p>
             <a:pPr algn="ctr"/>
             <a:r>
-              <a:rPr lang="fr-FR" sz="41300" b="1" dirty="0">
+              <a:rPr lang="fr-FR" sz="41300" b="1" dirty="0" smtClean="0">
                 <a:solidFill>
                   <a:schemeClr val="accent5">
                     <a:lumMod val="20000"/>
@@ -4355,6 +5277,16 @@
               </a:rPr>
               <a:t>?</a:t>
             </a:r>
+            <a:endParaRPr lang="fr-FR" sz="41300" b="1" dirty="0">
+              <a:solidFill>
+                <a:schemeClr val="accent5">
+                  <a:lumMod val="20000"/>
+                  <a:lumOff val="80000"/>
+                </a:schemeClr>
+              </a:solidFill>
+              <a:latin typeface="Mangal" panose="02040503050203030202" pitchFamily="18" charset="0"/>
+              <a:cs typeface="Mangal" panose="02040503050203030202" pitchFamily="18" charset="0"/>
+            </a:endParaRPr>
           </a:p>
         </p:txBody>
       </p:sp>
@@ -4390,13 +5322,18 @@
               <a:buNone/>
             </a:pPr>
             <a:r>
-              <a:rPr lang="fr-FR" dirty="0">
+              <a:rPr lang="fr-FR" dirty="0" smtClean="0">
                 <a:solidFill>
                   <a:schemeClr val="bg1"/>
                 </a:solidFill>
               </a:rPr>
               <a:t>Avez-vous des questions ?</a:t>
             </a:r>
+            <a:endParaRPr lang="fr-FR" dirty="0">
+              <a:solidFill>
+                <a:schemeClr val="bg1"/>
+              </a:solidFill>
+            </a:endParaRPr>
           </a:p>
         </p:txBody>
       </p:sp>
@@ -4418,7 +5355,7 @@
             <a:fld id="{9905D2EB-A0C9-4269-BED7-F488BFFF1574}" type="datetime1">
               <a:rPr lang="fr-FR" smtClean="0"/>
               <a:pPr/>
-              <a:t>20/01/2017</a:t>
+              <a:t>20/12/2016</a:t>
             </a:fld>
             <a:endParaRPr lang="fr-FR" dirty="0"/>
           </a:p>
@@ -4440,9 +5377,14 @@
           <a:lstStyle/>
           <a:p>
             <a:r>
-              <a:rPr lang="fr-FR" dirty="0"/>
-              <a:t>Galt – PI S5 IL – Itération 2</a:t>
-            </a:r>
+              <a:rPr lang="fr-FR" dirty="0" smtClean="0"/>
+              <a:t>Galt – PI S5 IL – Itération </a:t>
+            </a:r>
+            <a:r>
+              <a:rPr lang="fr-FR" dirty="0" smtClean="0"/>
+              <a:t>2</a:t>
+            </a:r>
+            <a:endParaRPr lang="fr-FR" dirty="0"/>
           </a:p>
         </p:txBody>
       </p:sp>
@@ -4464,7 +5406,7 @@
             <a:fld id="{CE35DAD6-85E4-415C-A280-4771D4FE3E59}" type="slidenum">
               <a:rPr lang="fr-FR" smtClean="0"/>
               <a:pPr/>
-              <a:t>5</a:t>
+              <a:t>8</a:t>
             </a:fld>
             <a:endParaRPr lang="fr-FR" dirty="0"/>
           </a:p>
@@ -4480,6 +5422,13 @@
   <p:clrMapOvr>
     <a:masterClrMapping/>
   </p:clrMapOvr>
+  <p:timing>
+    <p:tnLst>
+      <p:par>
+        <p:cTn id="1" dur="indefinite" restart="never" nodeType="tmRoot"/>
+      </p:par>
+    </p:tnLst>
+  </p:timing>
 </p:sld>
 </file>
 
@@ -5071,4 +6020,47 @@
     </a:ext>
   </a:extLst>
 </a:theme>
+</file>
+
+<file path=ppt/theme/themeOverride1.xml><?xml version="1.0" encoding="utf-8"?>
+<a:themeOverride xmlns:a="http://schemas.openxmlformats.org/drawingml/2006/main">
+  <a:clrScheme name="Blue Warm">
+    <a:dk1>
+      <a:sysClr val="windowText" lastClr="000000"/>
+    </a:dk1>
+    <a:lt1>
+      <a:sysClr val="window" lastClr="FFFFFF"/>
+    </a:lt1>
+    <a:dk2>
+      <a:srgbClr val="242852"/>
+    </a:dk2>
+    <a:lt2>
+      <a:srgbClr val="ACCBF9"/>
+    </a:lt2>
+    <a:accent1>
+      <a:srgbClr val="4A66AC"/>
+    </a:accent1>
+    <a:accent2>
+      <a:srgbClr val="629DD1"/>
+    </a:accent2>
+    <a:accent3>
+      <a:srgbClr val="297FD5"/>
+    </a:accent3>
+    <a:accent4>
+      <a:srgbClr val="7F8FA9"/>
+    </a:accent4>
+    <a:accent5>
+      <a:srgbClr val="5AA2AE"/>
+    </a:accent5>
+    <a:accent6>
+      <a:srgbClr val="9D90A0"/>
+    </a:accent6>
+    <a:hlink>
+      <a:srgbClr val="9454C3"/>
+    </a:hlink>
+    <a:folHlink>
+      <a:srgbClr val="3EBBF0"/>
+    </a:folHlink>
+  </a:clrScheme>
+</a:themeOverride>
 </file>
</xml_diff>